<commit_message>
database + pep8 + comments + template to final release
</commit_message>
<xml_diff>
--- a/PyQT_present.pptx
+++ b/PyQT_present.pptx
@@ -6,6 +6,11 @@
   </p:sldMasterIdLst>
   <p:sldIdLst>
     <p:sldId id="256" r:id="rId2"/>
+    <p:sldId id="257" r:id="rId3"/>
+    <p:sldId id="258" r:id="rId4"/>
+    <p:sldId id="259" r:id="rId5"/>
+    <p:sldId id="260" r:id="rId6"/>
+    <p:sldId id="261" r:id="rId7"/>
   </p:sldIdLst>
   <p:sldSz cx="9144000" cy="6858000" type="screen4x3"/>
   <p:notesSz cx="6858000" cy="9144000"/>
@@ -288,7 +293,7 @@
           <a:p>
             <a:fld id="{B4C71EC6-210F-42DE-9C53-41977AD35B3D}" type="datetimeFigureOut">
               <a:rPr lang="ru-RU" smtClean="0"/>
-              <a:t>02.11.2021</a:t>
+              <a:t>07.11.2021</a:t>
             </a:fld>
             <a:endParaRPr lang="ru-RU"/>
           </a:p>
@@ -453,7 +458,7 @@
           <a:p>
             <a:fld id="{B4C71EC6-210F-42DE-9C53-41977AD35B3D}" type="datetimeFigureOut">
               <a:rPr lang="ru-RU" smtClean="0"/>
-              <a:t>02.11.2021</a:t>
+              <a:t>07.11.2021</a:t>
             </a:fld>
             <a:endParaRPr lang="ru-RU"/>
           </a:p>
@@ -628,7 +633,7 @@
           <a:p>
             <a:fld id="{B4C71EC6-210F-42DE-9C53-41977AD35B3D}" type="datetimeFigureOut">
               <a:rPr lang="ru-RU" smtClean="0"/>
-              <a:t>02.11.2021</a:t>
+              <a:t>07.11.2021</a:t>
             </a:fld>
             <a:endParaRPr lang="ru-RU"/>
           </a:p>
@@ -793,7 +798,7 @@
           <a:p>
             <a:fld id="{B4C71EC6-210F-42DE-9C53-41977AD35B3D}" type="datetimeFigureOut">
               <a:rPr lang="ru-RU" smtClean="0"/>
-              <a:t>02.11.2021</a:t>
+              <a:t>07.11.2021</a:t>
             </a:fld>
             <a:endParaRPr lang="ru-RU"/>
           </a:p>
@@ -1034,7 +1039,7 @@
           <a:p>
             <a:fld id="{B4C71EC6-210F-42DE-9C53-41977AD35B3D}" type="datetimeFigureOut">
               <a:rPr lang="ru-RU" smtClean="0"/>
-              <a:t>02.11.2021</a:t>
+              <a:t>07.11.2021</a:t>
             </a:fld>
             <a:endParaRPr lang="ru-RU"/>
           </a:p>
@@ -1317,7 +1322,7 @@
           <a:p>
             <a:fld id="{B4C71EC6-210F-42DE-9C53-41977AD35B3D}" type="datetimeFigureOut">
               <a:rPr lang="ru-RU" smtClean="0"/>
-              <a:t>02.11.2021</a:t>
+              <a:t>07.11.2021</a:t>
             </a:fld>
             <a:endParaRPr lang="ru-RU"/>
           </a:p>
@@ -1734,7 +1739,7 @@
           <a:p>
             <a:fld id="{B4C71EC6-210F-42DE-9C53-41977AD35B3D}" type="datetimeFigureOut">
               <a:rPr lang="ru-RU" smtClean="0"/>
-              <a:t>02.11.2021</a:t>
+              <a:t>07.11.2021</a:t>
             </a:fld>
             <a:endParaRPr lang="ru-RU"/>
           </a:p>
@@ -1847,7 +1852,7 @@
           <a:p>
             <a:fld id="{B4C71EC6-210F-42DE-9C53-41977AD35B3D}" type="datetimeFigureOut">
               <a:rPr lang="ru-RU" smtClean="0"/>
-              <a:t>02.11.2021</a:t>
+              <a:t>07.11.2021</a:t>
             </a:fld>
             <a:endParaRPr lang="ru-RU"/>
           </a:p>
@@ -1937,7 +1942,7 @@
           <a:p>
             <a:fld id="{B4C71EC6-210F-42DE-9C53-41977AD35B3D}" type="datetimeFigureOut">
               <a:rPr lang="ru-RU" smtClean="0"/>
-              <a:t>02.11.2021</a:t>
+              <a:t>07.11.2021</a:t>
             </a:fld>
             <a:endParaRPr lang="ru-RU"/>
           </a:p>
@@ -2209,7 +2214,7 @@
           <a:p>
             <a:fld id="{B4C71EC6-210F-42DE-9C53-41977AD35B3D}" type="datetimeFigureOut">
               <a:rPr lang="ru-RU" smtClean="0"/>
-              <a:t>02.11.2021</a:t>
+              <a:t>07.11.2021</a:t>
             </a:fld>
             <a:endParaRPr lang="ru-RU"/>
           </a:p>
@@ -2457,7 +2462,7 @@
           <a:p>
             <a:fld id="{B4C71EC6-210F-42DE-9C53-41977AD35B3D}" type="datetimeFigureOut">
               <a:rPr lang="ru-RU" smtClean="0"/>
-              <a:t>02.11.2021</a:t>
+              <a:t>07.11.2021</a:t>
             </a:fld>
             <a:endParaRPr lang="ru-RU"/>
           </a:p>
@@ -2665,7 +2670,7 @@
           <a:p>
             <a:fld id="{B4C71EC6-210F-42DE-9C53-41977AD35B3D}" type="datetimeFigureOut">
               <a:rPr lang="ru-RU" smtClean="0"/>
-              <a:t>02.11.2021</a:t>
+              <a:t>07.11.2021</a:t>
             </a:fld>
             <a:endParaRPr lang="ru-RU"/>
           </a:p>
@@ -3113,6 +3118,919 @@
     <p:extLst>
       <p:ext uri="{BB962C8B-B14F-4D97-AF65-F5344CB8AC3E}">
         <p14:creationId xmlns:p14="http://schemas.microsoft.com/office/powerpoint/2010/main" val="3769059270"/>
+      </p:ext>
+    </p:extLst>
+  </p:cSld>
+  <p:clrMapOvr>
+    <a:masterClrMapping/>
+  </p:clrMapOvr>
+</p:sld>
+</file>
+
+<file path=ppt/slides/slide2.xml><?xml version="1.0" encoding="utf-8"?>
+<p:sld xmlns:a="http://schemas.openxmlformats.org/drawingml/2006/main" xmlns:r="http://schemas.openxmlformats.org/officeDocument/2006/relationships" xmlns:p="http://schemas.openxmlformats.org/presentationml/2006/main">
+  <p:cSld>
+    <p:spTree>
+      <p:nvGrpSpPr>
+        <p:cNvPr id="1" name=""/>
+        <p:cNvGrpSpPr/>
+        <p:nvPr/>
+      </p:nvGrpSpPr>
+      <p:grpSpPr>
+        <a:xfrm>
+          <a:off x="0" y="0"/>
+          <a:ext cx="0" cy="0"/>
+          <a:chOff x="0" y="0"/>
+          <a:chExt cx="0" cy="0"/>
+        </a:xfrm>
+      </p:grpSpPr>
+      <p:sp>
+        <p:nvSpPr>
+          <p:cNvPr id="2" name="Заголовок 1"/>
+          <p:cNvSpPr>
+            <a:spLocks noGrp="1"/>
+          </p:cNvSpPr>
+          <p:nvPr>
+            <p:ph type="title"/>
+          </p:nvPr>
+        </p:nvSpPr>
+        <p:spPr/>
+        <p:txBody>
+          <a:bodyPr/>
+          <a:lstStyle/>
+          <a:p>
+            <a:r>
+              <a:rPr lang="ru-RU" dirty="0" smtClean="0"/>
+              <a:t>Тема проекта</a:t>
+            </a:r>
+            <a:endParaRPr lang="ru-RU" dirty="0"/>
+          </a:p>
+        </p:txBody>
+      </p:sp>
+      <p:sp>
+        <p:nvSpPr>
+          <p:cNvPr id="3" name="Объект 2"/>
+          <p:cNvSpPr>
+            <a:spLocks noGrp="1"/>
+          </p:cNvSpPr>
+          <p:nvPr>
+            <p:ph idx="1"/>
+          </p:nvPr>
+        </p:nvSpPr>
+        <p:spPr>
+          <a:xfrm>
+            <a:off x="457200" y="1600200"/>
+            <a:ext cx="8229600" cy="5141168"/>
+          </a:xfrm>
+        </p:spPr>
+        <p:txBody>
+          <a:bodyPr>
+            <a:normAutofit lnSpcReduction="10000"/>
+          </a:bodyPr>
+          <a:lstStyle/>
+          <a:p>
+            <a:r>
+              <a:rPr lang="ru-RU" dirty="0" smtClean="0"/>
+              <a:t>Давно хотели создать свой </a:t>
+            </a:r>
+            <a:r>
+              <a:rPr lang="ru-RU" dirty="0" err="1" smtClean="0"/>
+              <a:t>мем</a:t>
+            </a:r>
+            <a:r>
+              <a:rPr lang="ru-RU" dirty="0" smtClean="0"/>
+              <a:t>? Тогда вам поможет новый </a:t>
+            </a:r>
+            <a:r>
+              <a:rPr lang="en-US" dirty="0" smtClean="0"/>
+              <a:t>Meme Generator, </a:t>
+            </a:r>
+            <a:r>
+              <a:rPr lang="ru-RU" dirty="0" smtClean="0"/>
+              <a:t>созданный на </a:t>
+            </a:r>
+            <a:r>
+              <a:rPr lang="en-US" dirty="0" err="1" smtClean="0"/>
+              <a:t>PyQT</a:t>
+            </a:r>
+            <a:r>
+              <a:rPr lang="en-US" dirty="0" smtClean="0"/>
+              <a:t> </a:t>
+            </a:r>
+            <a:r>
+              <a:rPr lang="ru-RU" dirty="0" smtClean="0"/>
+              <a:t>с использованием </a:t>
+            </a:r>
+            <a:r>
+              <a:rPr lang="en-US" dirty="0" smtClean="0"/>
+              <a:t>Pillow</a:t>
+            </a:r>
+          </a:p>
+          <a:p>
+            <a:r>
+              <a:rPr lang="ru-RU" dirty="0" smtClean="0"/>
+              <a:t>Вы можете создать свой </a:t>
+            </a:r>
+            <a:r>
+              <a:rPr lang="ru-RU" dirty="0" err="1" smtClean="0"/>
+              <a:t>мем</a:t>
+            </a:r>
+            <a:r>
+              <a:rPr lang="ru-RU" dirty="0" smtClean="0"/>
+              <a:t>, или использовать готовый шаблон и просто заполнить его</a:t>
+            </a:r>
+          </a:p>
+          <a:p>
+            <a:r>
+              <a:rPr lang="ru-RU" dirty="0" smtClean="0"/>
+              <a:t>Сохраните свой </a:t>
+            </a:r>
+            <a:r>
+              <a:rPr lang="ru-RU" dirty="0" err="1" smtClean="0"/>
+              <a:t>мем</a:t>
+            </a:r>
+            <a:r>
+              <a:rPr lang="ru-RU" dirty="0" smtClean="0"/>
+              <a:t> куда угодно в формате </a:t>
+            </a:r>
+            <a:r>
+              <a:rPr lang="en-US" dirty="0" smtClean="0"/>
+              <a:t>.</a:t>
+            </a:r>
+            <a:r>
+              <a:rPr lang="en-US" dirty="0" err="1" smtClean="0"/>
+              <a:t>png</a:t>
+            </a:r>
+            <a:r>
+              <a:rPr lang="en-US" dirty="0" smtClean="0"/>
+              <a:t>, .jpg </a:t>
+            </a:r>
+            <a:r>
+              <a:rPr lang="ru-RU" dirty="0" smtClean="0"/>
+              <a:t>или </a:t>
+            </a:r>
+            <a:r>
+              <a:rPr lang="en-US" dirty="0" smtClean="0"/>
+              <a:t>.jpeg</a:t>
+            </a:r>
+          </a:p>
+          <a:p>
+            <a:r>
+              <a:rPr lang="ru-RU" dirty="0" smtClean="0"/>
+              <a:t>Можете даже скопировать картинку в буфер обмена! </a:t>
+            </a:r>
+            <a:r>
+              <a:rPr lang="en-US" dirty="0" smtClean="0"/>
+              <a:t>(WIP)</a:t>
+            </a:r>
+            <a:endParaRPr lang="ru-RU" dirty="0"/>
+          </a:p>
+        </p:txBody>
+      </p:sp>
+    </p:spTree>
+    <p:extLst>
+      <p:ext uri="{BB962C8B-B14F-4D97-AF65-F5344CB8AC3E}">
+        <p14:creationId xmlns:p14="http://schemas.microsoft.com/office/powerpoint/2010/main" val="3299776890"/>
+      </p:ext>
+    </p:extLst>
+  </p:cSld>
+  <p:clrMapOvr>
+    <a:masterClrMapping/>
+  </p:clrMapOvr>
+</p:sld>
+</file>
+
+<file path=ppt/slides/slide3.xml><?xml version="1.0" encoding="utf-8"?>
+<p:sld xmlns:a="http://schemas.openxmlformats.org/drawingml/2006/main" xmlns:r="http://schemas.openxmlformats.org/officeDocument/2006/relationships" xmlns:p="http://schemas.openxmlformats.org/presentationml/2006/main">
+  <p:cSld>
+    <p:spTree>
+      <p:nvGrpSpPr>
+        <p:cNvPr id="1" name=""/>
+        <p:cNvGrpSpPr/>
+        <p:nvPr/>
+      </p:nvGrpSpPr>
+      <p:grpSpPr>
+        <a:xfrm>
+          <a:off x="0" y="0"/>
+          <a:ext cx="0" cy="0"/>
+          <a:chOff x="0" y="0"/>
+          <a:chExt cx="0" cy="0"/>
+        </a:xfrm>
+      </p:grpSpPr>
+      <p:sp>
+        <p:nvSpPr>
+          <p:cNvPr id="2" name="Заголовок 1"/>
+          <p:cNvSpPr>
+            <a:spLocks noGrp="1"/>
+          </p:cNvSpPr>
+          <p:nvPr>
+            <p:ph type="title"/>
+          </p:nvPr>
+        </p:nvSpPr>
+        <p:spPr/>
+        <p:txBody>
+          <a:bodyPr/>
+          <a:lstStyle/>
+          <a:p>
+            <a:r>
+              <a:rPr lang="ru-RU" dirty="0" smtClean="0"/>
+              <a:t>Интерфейс</a:t>
+            </a:r>
+            <a:endParaRPr lang="ru-RU" dirty="0"/>
+          </a:p>
+        </p:txBody>
+      </p:sp>
+      <p:sp>
+        <p:nvSpPr>
+          <p:cNvPr id="4" name="TextBox 3"/>
+          <p:cNvSpPr txBox="1"/>
+          <p:nvPr/>
+        </p:nvSpPr>
+        <p:spPr>
+          <a:xfrm>
+            <a:off x="4716016" y="1268760"/>
+            <a:ext cx="4392488" cy="5632311"/>
+          </a:xfrm>
+          <a:prstGeom prst="rect">
+            <a:avLst/>
+          </a:prstGeom>
+          <a:noFill/>
+        </p:spPr>
+        <p:txBody>
+          <a:bodyPr wrap="square" rtlCol="0">
+            <a:spAutoFit/>
+          </a:bodyPr>
+          <a:lstStyle/>
+          <a:p>
+            <a:pPr marL="285750" indent="-285750">
+              <a:buFont typeface="Wingdings"/>
+              <a:buChar char="ß"/>
+            </a:pPr>
+            <a:r>
+              <a:rPr lang="ru-RU" dirty="0" smtClean="0">
+                <a:sym typeface="Wingdings" panose="05000000000000000000" pitchFamily="2" charset="2"/>
+              </a:rPr>
+              <a:t>Главное окно программы в</a:t>
+            </a:r>
+            <a:r>
+              <a:rPr lang="ru-RU" dirty="0" smtClean="0"/>
+              <a:t>ыглядит вот так</a:t>
+            </a:r>
+          </a:p>
+          <a:p>
+            <a:r>
+              <a:rPr lang="ru-RU" i="1" u="sng" dirty="0" smtClean="0"/>
+              <a:t>Давайте разберём интерфейс</a:t>
+            </a:r>
+          </a:p>
+          <a:p>
+            <a:pPr marL="285750" indent="-285750">
+              <a:buFont typeface="Arial" panose="020B0604020202020204" pitchFamily="34" charset="0"/>
+              <a:buChar char="•"/>
+            </a:pPr>
+            <a:r>
+              <a:rPr lang="ru-RU" dirty="0" smtClean="0"/>
+              <a:t>Посередине изначально будет виден черный прямоугольник, который будет отображать создаваемый </a:t>
+            </a:r>
+            <a:r>
+              <a:rPr lang="ru-RU" dirty="0" err="1" smtClean="0"/>
+              <a:t>мем</a:t>
+            </a:r>
+            <a:endParaRPr lang="ru-RU" dirty="0" smtClean="0"/>
+          </a:p>
+          <a:p>
+            <a:pPr marL="285750" indent="-285750">
+              <a:buFont typeface="Arial" panose="020B0604020202020204" pitchFamily="34" charset="0"/>
+              <a:buChar char="•"/>
+            </a:pPr>
+            <a:r>
+              <a:rPr lang="ru-RU" dirty="0" smtClean="0"/>
+              <a:t>Поля Текст 1, Текст2, Картинка1, Картинка2 будут служить данными для создания </a:t>
+            </a:r>
+            <a:r>
+              <a:rPr lang="ru-RU" dirty="0" err="1" smtClean="0"/>
+              <a:t>мема</a:t>
+            </a:r>
+            <a:endParaRPr lang="ru-RU" dirty="0" smtClean="0"/>
+          </a:p>
+          <a:p>
+            <a:pPr marL="285750" indent="-285750">
+              <a:buFont typeface="Arial" panose="020B0604020202020204" pitchFamily="34" charset="0"/>
+              <a:buChar char="•"/>
+            </a:pPr>
+            <a:r>
+              <a:rPr lang="ru-RU" dirty="0" smtClean="0"/>
+              <a:t>Кнопка применить пересоздаст </a:t>
+            </a:r>
+            <a:r>
+              <a:rPr lang="ru-RU" dirty="0" err="1" smtClean="0"/>
+              <a:t>мем</a:t>
+            </a:r>
+            <a:r>
+              <a:rPr lang="ru-RU" dirty="0" smtClean="0"/>
+              <a:t> и отобразит изменения</a:t>
+            </a:r>
+          </a:p>
+          <a:p>
+            <a:pPr marL="285750" indent="-285750">
+              <a:buFont typeface="Arial" panose="020B0604020202020204" pitchFamily="34" charset="0"/>
+              <a:buChar char="•"/>
+            </a:pPr>
+            <a:r>
+              <a:rPr lang="ru-RU" dirty="0" smtClean="0"/>
+              <a:t>Кнопка сохранить сохранит ваш </a:t>
+            </a:r>
+            <a:r>
+              <a:rPr lang="ru-RU" dirty="0" err="1" smtClean="0"/>
+              <a:t>мем</a:t>
+            </a:r>
+            <a:r>
+              <a:rPr lang="ru-RU" dirty="0" smtClean="0"/>
+              <a:t>, при условии того, что вы изменили шаблон</a:t>
+            </a:r>
+          </a:p>
+          <a:p>
+            <a:pPr marL="285750" indent="-285750">
+              <a:buFont typeface="Arial" panose="020B0604020202020204" pitchFamily="34" charset="0"/>
+              <a:buChar char="•"/>
+            </a:pPr>
+            <a:r>
+              <a:rPr lang="ru-RU" dirty="0" smtClean="0"/>
+              <a:t>Кнопки вверху отвечают за задний фон приложения (Можете выбрать его на свой вкус!). Если надоест – кнопка </a:t>
+            </a:r>
+            <a:r>
+              <a:rPr lang="en-US" dirty="0" smtClean="0"/>
+              <a:t>‘D’ </a:t>
+            </a:r>
+            <a:r>
+              <a:rPr lang="ru-RU" dirty="0" smtClean="0"/>
+              <a:t>вернет цвет </a:t>
+            </a:r>
+            <a:r>
+              <a:rPr lang="ru-RU" dirty="0" err="1" smtClean="0"/>
+              <a:t>по-умолчанию</a:t>
+            </a:r>
+            <a:endParaRPr lang="ru-RU" dirty="0" smtClean="0"/>
+          </a:p>
+          <a:p>
+            <a:pPr marL="285750" indent="-285750">
+              <a:buFont typeface="Arial" panose="020B0604020202020204" pitchFamily="34" charset="0"/>
+              <a:buChar char="•"/>
+            </a:pPr>
+            <a:r>
+              <a:rPr lang="ru-RU" dirty="0" smtClean="0"/>
+              <a:t>Кнопка выбрать шаблон ведет нас на окно выбора шаблонов</a:t>
+            </a:r>
+          </a:p>
+        </p:txBody>
+      </p:sp>
+      <p:pic>
+        <p:nvPicPr>
+          <p:cNvPr id="1027" name="Picture 3"/>
+          <p:cNvPicPr>
+            <a:picLocks noGrp="1" noChangeAspect="1" noChangeArrowheads="1"/>
+          </p:cNvPicPr>
+          <p:nvPr>
+            <p:ph idx="1"/>
+          </p:nvPr>
+        </p:nvPicPr>
+        <p:blipFill>
+          <a:blip r:embed="rId2" cstate="print">
+            <a:extLst>
+              <a:ext uri="{28A0092B-C50C-407E-A947-70E740481C1C}">
+                <a14:useLocalDpi xmlns:a14="http://schemas.microsoft.com/office/drawing/2010/main" val="0"/>
+              </a:ext>
+            </a:extLst>
+          </a:blip>
+          <a:srcRect/>
+          <a:stretch>
+            <a:fillRect/>
+          </a:stretch>
+        </p:blipFill>
+        <p:spPr bwMode="auto">
+          <a:xfrm>
+            <a:off x="251520" y="1343263"/>
+            <a:ext cx="4464496" cy="3679802"/>
+          </a:xfrm>
+          <a:prstGeom prst="rect">
+            <a:avLst/>
+          </a:prstGeom>
+          <a:noFill/>
+          <a:ln>
+            <a:noFill/>
+          </a:ln>
+          <a:extLst>
+            <a:ext uri="{909E8E84-426E-40DD-AFC4-6F175D3DCCD1}">
+              <a14:hiddenFill xmlns:a14="http://schemas.microsoft.com/office/drawing/2010/main">
+                <a:solidFill>
+                  <a:schemeClr val="accent1"/>
+                </a:solidFill>
+              </a14:hiddenFill>
+            </a:ext>
+            <a:ext uri="{91240B29-F687-4F45-9708-019B960494DF}">
+              <a14:hiddenLine xmlns:a14="http://schemas.microsoft.com/office/drawing/2010/main" w="9525">
+                <a:solidFill>
+                  <a:schemeClr val="tx1"/>
+                </a:solidFill>
+                <a:miter lim="800000"/>
+                <a:headEnd/>
+                <a:tailEnd/>
+              </a14:hiddenLine>
+            </a:ext>
+          </a:extLst>
+        </p:spPr>
+      </p:pic>
+    </p:spTree>
+    <p:extLst>
+      <p:ext uri="{BB962C8B-B14F-4D97-AF65-F5344CB8AC3E}">
+        <p14:creationId xmlns:p14="http://schemas.microsoft.com/office/powerpoint/2010/main" val="2678509757"/>
+      </p:ext>
+    </p:extLst>
+  </p:cSld>
+  <p:clrMapOvr>
+    <a:masterClrMapping/>
+  </p:clrMapOvr>
+</p:sld>
+</file>
+
+<file path=ppt/slides/slide4.xml><?xml version="1.0" encoding="utf-8"?>
+<p:sld xmlns:a="http://schemas.openxmlformats.org/drawingml/2006/main" xmlns:r="http://schemas.openxmlformats.org/officeDocument/2006/relationships" xmlns:p="http://schemas.openxmlformats.org/presentationml/2006/main">
+  <p:cSld>
+    <p:spTree>
+      <p:nvGrpSpPr>
+        <p:cNvPr id="1" name=""/>
+        <p:cNvGrpSpPr/>
+        <p:nvPr/>
+      </p:nvGrpSpPr>
+      <p:grpSpPr>
+        <a:xfrm>
+          <a:off x="0" y="0"/>
+          <a:ext cx="0" cy="0"/>
+          <a:chOff x="0" y="0"/>
+          <a:chExt cx="0" cy="0"/>
+        </a:xfrm>
+      </p:grpSpPr>
+      <p:sp>
+        <p:nvSpPr>
+          <p:cNvPr id="2" name="Заголовок 1"/>
+          <p:cNvSpPr>
+            <a:spLocks noGrp="1"/>
+          </p:cNvSpPr>
+          <p:nvPr>
+            <p:ph type="title"/>
+          </p:nvPr>
+        </p:nvSpPr>
+        <p:spPr/>
+        <p:txBody>
+          <a:bodyPr/>
+          <a:lstStyle/>
+          <a:p>
+            <a:r>
+              <a:rPr lang="ru-RU" dirty="0" smtClean="0"/>
+              <a:t>Выбор шаблона</a:t>
+            </a:r>
+            <a:endParaRPr lang="ru-RU" dirty="0"/>
+          </a:p>
+        </p:txBody>
+      </p:sp>
+      <p:pic>
+        <p:nvPicPr>
+          <p:cNvPr id="2050" name="Picture 2"/>
+          <p:cNvPicPr>
+            <a:picLocks noGrp="1" noChangeAspect="1" noChangeArrowheads="1"/>
+          </p:cNvPicPr>
+          <p:nvPr>
+            <p:ph idx="1"/>
+          </p:nvPr>
+        </p:nvPicPr>
+        <p:blipFill>
+          <a:blip r:embed="rId2">
+            <a:extLst>
+              <a:ext uri="{28A0092B-C50C-407E-A947-70E740481C1C}">
+                <a14:useLocalDpi xmlns:a14="http://schemas.microsoft.com/office/drawing/2010/main" val="0"/>
+              </a:ext>
+            </a:extLst>
+          </a:blip>
+          <a:srcRect/>
+          <a:stretch>
+            <a:fillRect/>
+          </a:stretch>
+        </p:blipFill>
+        <p:spPr bwMode="auto">
+          <a:xfrm>
+            <a:off x="611560" y="1196753"/>
+            <a:ext cx="4367188" cy="3672408"/>
+          </a:xfrm>
+          <a:prstGeom prst="rect">
+            <a:avLst/>
+          </a:prstGeom>
+          <a:noFill/>
+          <a:ln>
+            <a:noFill/>
+          </a:ln>
+          <a:extLst>
+            <a:ext uri="{909E8E84-426E-40DD-AFC4-6F175D3DCCD1}">
+              <a14:hiddenFill xmlns:a14="http://schemas.microsoft.com/office/drawing/2010/main">
+                <a:solidFill>
+                  <a:schemeClr val="accent1"/>
+                </a:solidFill>
+              </a14:hiddenFill>
+            </a:ext>
+            <a:ext uri="{91240B29-F687-4F45-9708-019B960494DF}">
+              <a14:hiddenLine xmlns:a14="http://schemas.microsoft.com/office/drawing/2010/main" w="9525">
+                <a:solidFill>
+                  <a:schemeClr val="tx1"/>
+                </a:solidFill>
+                <a:miter lim="800000"/>
+                <a:headEnd/>
+                <a:tailEnd/>
+              </a14:hiddenLine>
+            </a:ext>
+          </a:extLst>
+        </p:spPr>
+      </p:pic>
+      <p:sp>
+        <p:nvSpPr>
+          <p:cNvPr id="4" name="TextBox 3"/>
+          <p:cNvSpPr txBox="1"/>
+          <p:nvPr/>
+        </p:nvSpPr>
+        <p:spPr>
+          <a:xfrm>
+            <a:off x="4932040" y="1196752"/>
+            <a:ext cx="4139952" cy="5355312"/>
+          </a:xfrm>
+          <a:prstGeom prst="rect">
+            <a:avLst/>
+          </a:prstGeom>
+          <a:noFill/>
+        </p:spPr>
+        <p:txBody>
+          <a:bodyPr wrap="square" rtlCol="0">
+            <a:spAutoFit/>
+          </a:bodyPr>
+          <a:lstStyle/>
+          <a:p>
+            <a:r>
+              <a:rPr lang="ru-RU" dirty="0" smtClean="0"/>
+              <a:t>Разберем окно выбора шаблона. </a:t>
+            </a:r>
+          </a:p>
+          <a:p>
+            <a:pPr marL="285750" indent="-285750">
+              <a:buFont typeface="Arial" panose="020B0604020202020204" pitchFamily="34" charset="0"/>
+              <a:buChar char="•"/>
+            </a:pPr>
+            <a:r>
+              <a:rPr lang="ru-RU" dirty="0" smtClean="0"/>
+              <a:t>В нем вы можете листать существующие шаблоны. </a:t>
+            </a:r>
+          </a:p>
+          <a:p>
+            <a:pPr marL="285750" indent="-285750">
+              <a:buFont typeface="Arial" panose="020B0604020202020204" pitchFamily="34" charset="0"/>
+              <a:buChar char="•"/>
+            </a:pPr>
+            <a:r>
+              <a:rPr lang="ru-RU" dirty="0" smtClean="0"/>
+              <a:t>Есть 2 типа шаблонов: Базовые и Пользовательские. </a:t>
+            </a:r>
+          </a:p>
+          <a:p>
+            <a:pPr marL="285750" indent="-285750">
+              <a:buFont typeface="Arial" panose="020B0604020202020204" pitchFamily="34" charset="0"/>
+              <a:buChar char="•"/>
+            </a:pPr>
+            <a:r>
+              <a:rPr lang="ru-RU" dirty="0" smtClean="0"/>
+              <a:t>Базовые прописаны в самой программе и не могут быть удалены (но вы всё ещё можете их изменить)</a:t>
+            </a:r>
+          </a:p>
+          <a:p>
+            <a:pPr marL="285750" indent="-285750">
+              <a:buFont typeface="Arial" panose="020B0604020202020204" pitchFamily="34" charset="0"/>
+              <a:buChar char="•"/>
+            </a:pPr>
+            <a:r>
+              <a:rPr lang="ru-RU" dirty="0" smtClean="0"/>
+              <a:t>Пользовательские создаются с помощью кнопки создать и небольшого помощника создания шаблонов. Также они могут быть полностью изменены и удалены. Их лимит вы можете прописать в </a:t>
+            </a:r>
+            <a:r>
+              <a:rPr lang="en-US" dirty="0" smtClean="0"/>
+              <a:t>JSON </a:t>
+            </a:r>
+            <a:r>
+              <a:rPr lang="ru-RU" dirty="0" smtClean="0"/>
+              <a:t>файле в папке </a:t>
+            </a:r>
+            <a:r>
+              <a:rPr lang="en-US" dirty="0" smtClean="0"/>
+              <a:t>Data</a:t>
+            </a:r>
+          </a:p>
+          <a:p>
+            <a:pPr marL="285750" indent="-285750">
+              <a:buFont typeface="Arial" panose="020B0604020202020204" pitchFamily="34" charset="0"/>
+              <a:buChar char="•"/>
+            </a:pPr>
+            <a:r>
+              <a:rPr lang="ru-RU" dirty="0" smtClean="0"/>
+              <a:t>Все шаблоны хранятся в виде данных в базе данных формата </a:t>
+            </a:r>
+            <a:r>
+              <a:rPr lang="en-US" dirty="0" err="1" smtClean="0"/>
+              <a:t>sqlite</a:t>
+            </a:r>
+            <a:r>
+              <a:rPr lang="en-US" dirty="0" smtClean="0"/>
+              <a:t> 3</a:t>
+            </a:r>
+          </a:p>
+          <a:p>
+            <a:pPr marL="285750" indent="-285750">
+              <a:buFont typeface="Arial" panose="020B0604020202020204" pitchFamily="34" charset="0"/>
+              <a:buChar char="•"/>
+            </a:pPr>
+            <a:r>
+              <a:rPr lang="ru-RU" dirty="0" smtClean="0"/>
+              <a:t>Также есть кнопки управления фоновым цветом</a:t>
+            </a:r>
+            <a:endParaRPr lang="ru-RU" dirty="0"/>
+          </a:p>
+        </p:txBody>
+      </p:sp>
+    </p:spTree>
+    <p:extLst>
+      <p:ext uri="{BB962C8B-B14F-4D97-AF65-F5344CB8AC3E}">
+        <p14:creationId xmlns:p14="http://schemas.microsoft.com/office/powerpoint/2010/main" val="505605037"/>
+      </p:ext>
+    </p:extLst>
+  </p:cSld>
+  <p:clrMapOvr>
+    <a:masterClrMapping/>
+  </p:clrMapOvr>
+</p:sld>
+</file>
+
+<file path=ppt/slides/slide5.xml><?xml version="1.0" encoding="utf-8"?>
+<p:sld xmlns:a="http://schemas.openxmlformats.org/drawingml/2006/main" xmlns:r="http://schemas.openxmlformats.org/officeDocument/2006/relationships" xmlns:p="http://schemas.openxmlformats.org/presentationml/2006/main">
+  <p:cSld>
+    <p:spTree>
+      <p:nvGrpSpPr>
+        <p:cNvPr id="1" name=""/>
+        <p:cNvGrpSpPr/>
+        <p:nvPr/>
+      </p:nvGrpSpPr>
+      <p:grpSpPr>
+        <a:xfrm>
+          <a:off x="0" y="0"/>
+          <a:ext cx="0" cy="0"/>
+          <a:chOff x="0" y="0"/>
+          <a:chExt cx="0" cy="0"/>
+        </a:xfrm>
+      </p:grpSpPr>
+      <p:sp>
+        <p:nvSpPr>
+          <p:cNvPr id="2" name="Заголовок 1"/>
+          <p:cNvSpPr>
+            <a:spLocks noGrp="1"/>
+          </p:cNvSpPr>
+          <p:nvPr>
+            <p:ph type="title"/>
+          </p:nvPr>
+        </p:nvSpPr>
+        <p:spPr/>
+        <p:txBody>
+          <a:bodyPr/>
+          <a:lstStyle/>
+          <a:p>
+            <a:r>
+              <a:rPr lang="ru-RU" dirty="0" smtClean="0"/>
+              <a:t>Сохранение </a:t>
+            </a:r>
+            <a:r>
+              <a:rPr lang="ru-RU" dirty="0" err="1" smtClean="0"/>
+              <a:t>мема</a:t>
+            </a:r>
+            <a:endParaRPr lang="ru-RU" dirty="0"/>
+          </a:p>
+        </p:txBody>
+      </p:sp>
+      <p:sp>
+        <p:nvSpPr>
+          <p:cNvPr id="3" name="Объект 2"/>
+          <p:cNvSpPr>
+            <a:spLocks noGrp="1"/>
+          </p:cNvSpPr>
+          <p:nvPr>
+            <p:ph idx="1"/>
+          </p:nvPr>
+        </p:nvSpPr>
+        <p:spPr>
+          <a:xfrm>
+            <a:off x="251520" y="1600200"/>
+            <a:ext cx="8712968" cy="4997152"/>
+          </a:xfrm>
+        </p:spPr>
+        <p:txBody>
+          <a:bodyPr>
+            <a:normAutofit fontScale="92500" lnSpcReduction="10000"/>
+          </a:bodyPr>
+          <a:lstStyle/>
+          <a:p>
+            <a:pPr marL="0" indent="0">
+              <a:buNone/>
+            </a:pPr>
+            <a:r>
+              <a:rPr lang="ru-RU" dirty="0" smtClean="0"/>
+              <a:t>Вы можете сохранить </a:t>
+            </a:r>
+            <a:r>
+              <a:rPr lang="ru-RU" dirty="0" err="1" smtClean="0"/>
+              <a:t>мем</a:t>
+            </a:r>
+            <a:r>
+              <a:rPr lang="ru-RU" dirty="0" smtClean="0"/>
+              <a:t> 2 путями:</a:t>
+            </a:r>
+          </a:p>
+          <a:p>
+            <a:r>
+              <a:rPr lang="ru-RU" dirty="0" smtClean="0"/>
+              <a:t>Первый и самый очевидный – кнопкой «Сохранить как», выбираете место назначение, имя и формат файла</a:t>
+            </a:r>
+          </a:p>
+          <a:p>
+            <a:r>
+              <a:rPr lang="ru-RU" dirty="0" smtClean="0"/>
+              <a:t>Второй же «ручной» метод: </a:t>
+            </a:r>
+          </a:p>
+          <a:p>
+            <a:pPr marL="0" indent="0">
+              <a:buNone/>
+            </a:pPr>
+            <a:r>
+              <a:rPr lang="ru-RU" dirty="0"/>
+              <a:t> </a:t>
+            </a:r>
+            <a:r>
+              <a:rPr lang="ru-RU" dirty="0" smtClean="0"/>
+              <a:t>   Сгенерированный </a:t>
+            </a:r>
+            <a:r>
+              <a:rPr lang="ru-RU" dirty="0" err="1" smtClean="0"/>
+              <a:t>мем</a:t>
+            </a:r>
+            <a:r>
+              <a:rPr lang="ru-RU" dirty="0" smtClean="0"/>
+              <a:t> находится в папке</a:t>
+            </a:r>
+          </a:p>
+          <a:p>
+            <a:pPr marL="0" indent="0">
+              <a:buNone/>
+            </a:pPr>
+            <a:r>
+              <a:rPr lang="ru-RU" dirty="0" smtClean="0"/>
+              <a:t>    программы «</a:t>
+            </a:r>
+            <a:r>
+              <a:rPr lang="en-US" dirty="0" smtClean="0"/>
+              <a:t>Images/Output/output.png</a:t>
+            </a:r>
+            <a:r>
+              <a:rPr lang="ru-RU" dirty="0" smtClean="0"/>
+              <a:t>»</a:t>
+            </a:r>
+            <a:endParaRPr lang="en-US" dirty="0" smtClean="0"/>
+          </a:p>
+          <a:p>
+            <a:pPr marL="0" indent="0">
+              <a:buNone/>
+            </a:pPr>
+            <a:r>
+              <a:rPr lang="ru-RU" dirty="0"/>
+              <a:t> </a:t>
+            </a:r>
+            <a:r>
+              <a:rPr lang="ru-RU" dirty="0" smtClean="0"/>
+              <a:t>   Но если вы хотите изменить разрешение</a:t>
+            </a:r>
+          </a:p>
+          <a:p>
+            <a:pPr marL="0" indent="0">
+              <a:buNone/>
+            </a:pPr>
+            <a:r>
+              <a:rPr lang="ru-RU" dirty="0" smtClean="0"/>
+              <a:t>    например на </a:t>
+            </a:r>
+            <a:r>
+              <a:rPr lang="en-US" dirty="0" smtClean="0"/>
+              <a:t>jpeg – </a:t>
+            </a:r>
+            <a:r>
+              <a:rPr lang="ru-RU" dirty="0" smtClean="0"/>
+              <a:t>воспользуйтесь первым</a:t>
+            </a:r>
+          </a:p>
+          <a:p>
+            <a:pPr marL="0" indent="0">
+              <a:buNone/>
+            </a:pPr>
+            <a:r>
+              <a:rPr lang="ru-RU" dirty="0"/>
+              <a:t> </a:t>
+            </a:r>
+            <a:r>
+              <a:rPr lang="ru-RU" dirty="0" smtClean="0"/>
+              <a:t>   способом</a:t>
+            </a:r>
+            <a:endParaRPr lang="ru-RU" dirty="0"/>
+          </a:p>
+        </p:txBody>
+      </p:sp>
+    </p:spTree>
+    <p:extLst>
+      <p:ext uri="{BB962C8B-B14F-4D97-AF65-F5344CB8AC3E}">
+        <p14:creationId xmlns:p14="http://schemas.microsoft.com/office/powerpoint/2010/main" val="265864183"/>
+      </p:ext>
+    </p:extLst>
+  </p:cSld>
+  <p:clrMapOvr>
+    <a:masterClrMapping/>
+  </p:clrMapOvr>
+</p:sld>
+</file>
+
+<file path=ppt/slides/slide6.xml><?xml version="1.0" encoding="utf-8"?>
+<p:sld xmlns:a="http://schemas.openxmlformats.org/drawingml/2006/main" xmlns:r="http://schemas.openxmlformats.org/officeDocument/2006/relationships" xmlns:p="http://schemas.openxmlformats.org/presentationml/2006/main">
+  <p:cSld>
+    <p:spTree>
+      <p:nvGrpSpPr>
+        <p:cNvPr id="1" name=""/>
+        <p:cNvGrpSpPr/>
+        <p:nvPr/>
+      </p:nvGrpSpPr>
+      <p:grpSpPr>
+        <a:xfrm>
+          <a:off x="0" y="0"/>
+          <a:ext cx="0" cy="0"/>
+          <a:chOff x="0" y="0"/>
+          <a:chExt cx="0" cy="0"/>
+        </a:xfrm>
+      </p:grpSpPr>
+      <p:sp>
+        <p:nvSpPr>
+          <p:cNvPr id="2" name="Заголовок 1"/>
+          <p:cNvSpPr>
+            <a:spLocks noGrp="1"/>
+          </p:cNvSpPr>
+          <p:nvPr>
+            <p:ph type="ctrTitle"/>
+          </p:nvPr>
+        </p:nvSpPr>
+        <p:spPr/>
+        <p:txBody>
+          <a:bodyPr/>
+          <a:lstStyle/>
+          <a:p>
+            <a:r>
+              <a:rPr lang="ru-RU" dirty="0" smtClean="0"/>
+              <a:t>Спасибо за внимание!</a:t>
+            </a:r>
+            <a:endParaRPr lang="ru-RU" dirty="0"/>
+          </a:p>
+        </p:txBody>
+      </p:sp>
+      <p:sp>
+        <p:nvSpPr>
+          <p:cNvPr id="3" name="Подзаголовок 2"/>
+          <p:cNvSpPr>
+            <a:spLocks noGrp="1"/>
+          </p:cNvSpPr>
+          <p:nvPr>
+            <p:ph type="subTitle" idx="1"/>
+          </p:nvPr>
+        </p:nvSpPr>
+        <p:spPr/>
+        <p:txBody>
+          <a:bodyPr/>
+          <a:lstStyle/>
+          <a:p>
+            <a:r>
+              <a:rPr lang="ru-RU" dirty="0" smtClean="0"/>
+              <a:t>Давайте я покажу вам всё это на практике!</a:t>
+            </a:r>
+            <a:endParaRPr lang="ru-RU" dirty="0"/>
+          </a:p>
+        </p:txBody>
+      </p:sp>
+    </p:spTree>
+    <p:extLst>
+      <p:ext uri="{BB962C8B-B14F-4D97-AF65-F5344CB8AC3E}">
+        <p14:creationId xmlns:p14="http://schemas.microsoft.com/office/powerpoint/2010/main" val="1051757365"/>
       </p:ext>
     </p:extLst>
   </p:cSld>

</xml_diff>